<commit_message>
Added cost slide to ppt deck
</commit_message>
<xml_diff>
--- a/docs/Azure Batch.pptx
+++ b/docs/Azure Batch.pptx
@@ -12,8 +12,9 @@
     <p:sldId id="260" r:id="rId6"/>
     <p:sldId id="261" r:id="rId7"/>
     <p:sldId id="262" r:id="rId8"/>
-    <p:sldId id="263" r:id="rId9"/>
-    <p:sldId id="264" r:id="rId10"/>
+    <p:sldId id="265" r:id="rId9"/>
+    <p:sldId id="263" r:id="rId10"/>
+    <p:sldId id="264" r:id="rId11"/>
   </p:sldIdLst>
   <p:sldSz cx="12192000" cy="6858000"/>
   <p:notesSz cx="6858000" cy="9144000"/>
@@ -112,6 +113,11 @@
       </a:defRPr>
     </a:lvl9pPr>
   </p:defaultTextStyle>
+  <p:extLst>
+    <p:ext uri="{EFAFB233-063F-42B5-8137-9DF3F51BA10A}">
+      <p15:sldGuideLst xmlns:p15="http://schemas.microsoft.com/office/powerpoint/2012/main"/>
+    </p:ext>
+  </p:extLst>
 </p:presentation>
 </file>
 
@@ -262,7 +268,7 @@
           <a:p>
             <a:fld id="{99721A49-C34B-4829-BB8B-2D6741701050}" type="datetimeFigureOut">
               <a:rPr lang="en-US" smtClean="0"/>
-              <a:t>11/28/2021</a:t>
+              <a:t>12/24/2021</a:t>
             </a:fld>
             <a:endParaRPr lang="en-US"/>
           </a:p>
@@ -460,7 +466,7 @@
           <a:p>
             <a:fld id="{99721A49-C34B-4829-BB8B-2D6741701050}" type="datetimeFigureOut">
               <a:rPr lang="en-US" smtClean="0"/>
-              <a:t>11/28/2021</a:t>
+              <a:t>12/24/2021</a:t>
             </a:fld>
             <a:endParaRPr lang="en-US"/>
           </a:p>
@@ -668,7 +674,7 @@
           <a:p>
             <a:fld id="{99721A49-C34B-4829-BB8B-2D6741701050}" type="datetimeFigureOut">
               <a:rPr lang="en-US" smtClean="0"/>
-              <a:t>11/28/2021</a:t>
+              <a:t>12/24/2021</a:t>
             </a:fld>
             <a:endParaRPr lang="en-US"/>
           </a:p>
@@ -866,7 +872,7 @@
           <a:p>
             <a:fld id="{99721A49-C34B-4829-BB8B-2D6741701050}" type="datetimeFigureOut">
               <a:rPr lang="en-US" smtClean="0"/>
-              <a:t>11/28/2021</a:t>
+              <a:t>12/24/2021</a:t>
             </a:fld>
             <a:endParaRPr lang="en-US"/>
           </a:p>
@@ -1141,7 +1147,7 @@
           <a:p>
             <a:fld id="{99721A49-C34B-4829-BB8B-2D6741701050}" type="datetimeFigureOut">
               <a:rPr lang="en-US" smtClean="0"/>
-              <a:t>11/28/2021</a:t>
+              <a:t>12/24/2021</a:t>
             </a:fld>
             <a:endParaRPr lang="en-US"/>
           </a:p>
@@ -1406,7 +1412,7 @@
           <a:p>
             <a:fld id="{99721A49-C34B-4829-BB8B-2D6741701050}" type="datetimeFigureOut">
               <a:rPr lang="en-US" smtClean="0"/>
-              <a:t>11/28/2021</a:t>
+              <a:t>12/24/2021</a:t>
             </a:fld>
             <a:endParaRPr lang="en-US"/>
           </a:p>
@@ -1818,7 +1824,7 @@
           <a:p>
             <a:fld id="{99721A49-C34B-4829-BB8B-2D6741701050}" type="datetimeFigureOut">
               <a:rPr lang="en-US" smtClean="0"/>
-              <a:t>11/28/2021</a:t>
+              <a:t>12/24/2021</a:t>
             </a:fld>
             <a:endParaRPr lang="en-US"/>
           </a:p>
@@ -1959,7 +1965,7 @@
           <a:p>
             <a:fld id="{99721A49-C34B-4829-BB8B-2D6741701050}" type="datetimeFigureOut">
               <a:rPr lang="en-US" smtClean="0"/>
-              <a:t>11/28/2021</a:t>
+              <a:t>12/24/2021</a:t>
             </a:fld>
             <a:endParaRPr lang="en-US"/>
           </a:p>
@@ -2072,7 +2078,7 @@
           <a:p>
             <a:fld id="{99721A49-C34B-4829-BB8B-2D6741701050}" type="datetimeFigureOut">
               <a:rPr lang="en-US" smtClean="0"/>
-              <a:t>11/28/2021</a:t>
+              <a:t>12/24/2021</a:t>
             </a:fld>
             <a:endParaRPr lang="en-US"/>
           </a:p>
@@ -2383,7 +2389,7 @@
           <a:p>
             <a:fld id="{99721A49-C34B-4829-BB8B-2D6741701050}" type="datetimeFigureOut">
               <a:rPr lang="en-US" smtClean="0"/>
-              <a:t>11/28/2021</a:t>
+              <a:t>12/24/2021</a:t>
             </a:fld>
             <a:endParaRPr lang="en-US"/>
           </a:p>
@@ -2671,7 +2677,7 @@
           <a:p>
             <a:fld id="{99721A49-C34B-4829-BB8B-2D6741701050}" type="datetimeFigureOut">
               <a:rPr lang="en-US" smtClean="0"/>
-              <a:t>11/28/2021</a:t>
+              <a:t>12/24/2021</a:t>
             </a:fld>
             <a:endParaRPr lang="en-US"/>
           </a:p>
@@ -2912,7 +2918,7 @@
           <a:p>
             <a:fld id="{99721A49-C34B-4829-BB8B-2D6741701050}" type="datetimeFigureOut">
               <a:rPr lang="en-US" smtClean="0"/>
-              <a:t>11/28/2021</a:t>
+              <a:t>12/24/2021</a:t>
             </a:fld>
             <a:endParaRPr lang="en-US"/>
           </a:p>
@@ -3398,6 +3404,64 @@
 </p:sld>
 </file>
 
+<file path=ppt/slides/slide10.xml><?xml version="1.0" encoding="utf-8"?>
+<p:sld xmlns:a="http://schemas.openxmlformats.org/drawingml/2006/main" xmlns:r="http://schemas.openxmlformats.org/officeDocument/2006/relationships" xmlns:p="http://schemas.openxmlformats.org/presentationml/2006/main">
+  <p:cSld>
+    <p:spTree>
+      <p:nvGrpSpPr>
+        <p:cNvPr id="1" name=""/>
+        <p:cNvGrpSpPr/>
+        <p:nvPr/>
+      </p:nvGrpSpPr>
+      <p:grpSpPr>
+        <a:xfrm>
+          <a:off x="0" y="0"/>
+          <a:ext cx="0" cy="0"/>
+          <a:chOff x="0" y="0"/>
+          <a:chExt cx="0" cy="0"/>
+        </a:xfrm>
+      </p:grpSpPr>
+      <p:sp>
+        <p:nvSpPr>
+          <p:cNvPr id="2" name="Title 1">
+            <a:extLst>
+              <a:ext uri="{FF2B5EF4-FFF2-40B4-BE49-F238E27FC236}">
+                <a16:creationId xmlns:a16="http://schemas.microsoft.com/office/drawing/2014/main" id="{52658C3D-CB1F-4BC7-8133-8CB492F2D437}"/>
+              </a:ext>
+            </a:extLst>
+          </p:cNvPr>
+          <p:cNvSpPr>
+            <a:spLocks noGrp="1"/>
+          </p:cNvSpPr>
+          <p:nvPr>
+            <p:ph type="ctrTitle"/>
+          </p:nvPr>
+        </p:nvSpPr>
+        <p:spPr/>
+        <p:txBody>
+          <a:bodyPr/>
+          <a:lstStyle/>
+          <a:p>
+            <a:r>
+              <a:rPr lang="en-US" dirty="0"/>
+              <a:t>Thanks for watching!</a:t>
+            </a:r>
+          </a:p>
+        </p:txBody>
+      </p:sp>
+    </p:spTree>
+    <p:extLst>
+      <p:ext uri="{BB962C8B-B14F-4D97-AF65-F5344CB8AC3E}">
+        <p14:creationId xmlns:p14="http://schemas.microsoft.com/office/powerpoint/2010/main" val="2317227721"/>
+      </p:ext>
+    </p:extLst>
+  </p:cSld>
+  <p:clrMapOvr>
+    <a:masterClrMapping/>
+  </p:clrMapOvr>
+</p:sld>
+</file>
+
 <file path=ppt/slides/slide2.xml><?xml version="1.0" encoding="utf-8"?>
 <p:sld xmlns:a="http://schemas.openxmlformats.org/drawingml/2006/main" xmlns:r="http://schemas.openxmlformats.org/officeDocument/2006/relationships" xmlns:p="http://schemas.openxmlformats.org/presentationml/2006/main">
   <p:cSld>
@@ -4319,7 +4383,7 @@
           <a:p>
             <a:r>
               <a:rPr lang="en-US" dirty="0"/>
-              <a:t>Resources</a:t>
+              <a:t>Cost</a:t>
             </a:r>
           </a:p>
         </p:txBody>
@@ -4347,71 +4411,29 @@
           <a:p>
             <a:r>
               <a:rPr lang="en-US" dirty="0"/>
-              <a:t>Microsoft Learn</a:t>
-            </a:r>
-          </a:p>
-          <a:p>
-            <a:pPr lvl="1"/>
+              <a:t>Pay for virtual machines and storage.</a:t>
+            </a:r>
+          </a:p>
+          <a:p>
             <a:r>
               <a:rPr lang="en-US" dirty="0"/>
-              <a:t>Run parallel tasks in Azure Batch with the Azure CLI</a:t>
-            </a:r>
-          </a:p>
-          <a:p>
-            <a:pPr lvl="2"/>
-            <a:r>
-              <a:rPr lang="en-US" dirty="0">
-                <a:hlinkClick r:id="rId2"/>
-              </a:rPr>
-              <a:t>https://docs.microsoft.com/en-us/learn/modules/run-parallel-tasks-in-azure-batch-with-the-azure-cli/</a:t>
-            </a:r>
-            <a:endParaRPr lang="en-US" dirty="0"/>
-          </a:p>
-          <a:p>
-            <a:pPr lvl="1"/>
+              <a:t>No additional cost for </a:t>
+            </a:r>
+            <a:r>
+              <a:rPr lang="en-US"/>
+              <a:t>Azure Batch</a:t>
+            </a:r>
             <a:r>
               <a:rPr lang="en-US" dirty="0"/>
-              <a:t>Create an app to run parallel compute jobs in Azure Batch</a:t>
-            </a:r>
-          </a:p>
-          <a:p>
-            <a:pPr lvl="2"/>
-            <a:r>
-              <a:rPr lang="en-US" dirty="0">
-                <a:hlinkClick r:id="rId3"/>
-              </a:rPr>
-              <a:t>https://docs.microsoft.com/en-us/learn/modules/create-an-app-to-run-parallel-compute-jobs-in-azure-batch/</a:t>
-            </a:r>
-            <a:endParaRPr lang="en-US" dirty="0"/>
-          </a:p>
-          <a:p>
-            <a:r>
-              <a:rPr lang="en-US" dirty="0"/>
-              <a:t>Azure Batch documentation</a:t>
-            </a:r>
-          </a:p>
-          <a:p>
-            <a:pPr lvl="1"/>
-            <a:r>
-              <a:rPr lang="en-US" dirty="0">
-                <a:hlinkClick r:id="rId4"/>
-              </a:rPr>
-              <a:t>https://docs.microsoft.com/en-us/azure/batch/</a:t>
-            </a:r>
-            <a:endParaRPr lang="en-US" dirty="0"/>
-          </a:p>
-          <a:p>
-            <a:pPr marL="457200" lvl="1" indent="0">
-              <a:buNone/>
-            </a:pPr>
-            <a:endParaRPr lang="en-US" dirty="0"/>
+              <a:t>.</a:t>
+            </a:r>
           </a:p>
         </p:txBody>
       </p:sp>
     </p:spTree>
     <p:extLst>
       <p:ext uri="{BB962C8B-B14F-4D97-AF65-F5344CB8AC3E}">
-        <p14:creationId xmlns:p14="http://schemas.microsoft.com/office/powerpoint/2010/main" val="3313837940"/>
+        <p14:creationId xmlns:p14="http://schemas.microsoft.com/office/powerpoint/2010/main" val="2848029667"/>
       </p:ext>
     </p:extLst>
   </p:cSld>
@@ -4443,15 +4465,15 @@
           <p:cNvPr id="2" name="Title 1">
             <a:extLst>
               <a:ext uri="{FF2B5EF4-FFF2-40B4-BE49-F238E27FC236}">
-                <a16:creationId xmlns:a16="http://schemas.microsoft.com/office/drawing/2014/main" id="{52658C3D-CB1F-4BC7-8133-8CB492F2D437}"/>
-              </a:ext>
-            </a:extLst>
-          </p:cNvPr>
-          <p:cNvSpPr>
-            <a:spLocks noGrp="1"/>
-          </p:cNvSpPr>
-          <p:nvPr>
-            <p:ph type="ctrTitle"/>
+                <a16:creationId xmlns:a16="http://schemas.microsoft.com/office/drawing/2014/main" id="{B55FD4CB-3C6F-433F-A6CE-8613214F7F4B}"/>
+              </a:ext>
+            </a:extLst>
+          </p:cNvPr>
+          <p:cNvSpPr>
+            <a:spLocks noGrp="1"/>
+          </p:cNvSpPr>
+          <p:nvPr>
+            <p:ph type="title"/>
           </p:nvPr>
         </p:nvSpPr>
         <p:spPr/>
@@ -4461,15 +4483,99 @@
           <a:p>
             <a:r>
               <a:rPr lang="en-US" dirty="0"/>
-              <a:t>Thanks for watching!</a:t>
-            </a:r>
+              <a:t>Resources</a:t>
+            </a:r>
+          </a:p>
+        </p:txBody>
+      </p:sp>
+      <p:sp>
+        <p:nvSpPr>
+          <p:cNvPr id="3" name="Content Placeholder 2">
+            <a:extLst>
+              <a:ext uri="{FF2B5EF4-FFF2-40B4-BE49-F238E27FC236}">
+                <a16:creationId xmlns:a16="http://schemas.microsoft.com/office/drawing/2014/main" id="{E2FE0049-5C4D-40DD-91C3-B3A2008F54E3}"/>
+              </a:ext>
+            </a:extLst>
+          </p:cNvPr>
+          <p:cNvSpPr>
+            <a:spLocks noGrp="1"/>
+          </p:cNvSpPr>
+          <p:nvPr>
+            <p:ph idx="1"/>
+          </p:nvPr>
+        </p:nvSpPr>
+        <p:spPr/>
+        <p:txBody>
+          <a:bodyPr/>
+          <a:lstStyle/>
+          <a:p>
+            <a:r>
+              <a:rPr lang="en-US" dirty="0"/>
+              <a:t>Microsoft Learn</a:t>
+            </a:r>
+          </a:p>
+          <a:p>
+            <a:pPr lvl="1"/>
+            <a:r>
+              <a:rPr lang="en-US" dirty="0"/>
+              <a:t>Run parallel tasks in Azure Batch with the Azure CLI</a:t>
+            </a:r>
+          </a:p>
+          <a:p>
+            <a:pPr lvl="2"/>
+            <a:r>
+              <a:rPr lang="en-US" dirty="0">
+                <a:hlinkClick r:id="rId2"/>
+              </a:rPr>
+              <a:t>https://docs.microsoft.com/en-us/learn/modules/run-parallel-tasks-in-azure-batch-with-the-azure-cli/</a:t>
+            </a:r>
+            <a:endParaRPr lang="en-US" dirty="0"/>
+          </a:p>
+          <a:p>
+            <a:pPr lvl="1"/>
+            <a:r>
+              <a:rPr lang="en-US" dirty="0"/>
+              <a:t>Create an app to run parallel compute jobs in Azure Batch</a:t>
+            </a:r>
+          </a:p>
+          <a:p>
+            <a:pPr lvl="2"/>
+            <a:r>
+              <a:rPr lang="en-US" dirty="0">
+                <a:hlinkClick r:id="rId3"/>
+              </a:rPr>
+              <a:t>https://docs.microsoft.com/en-us/learn/modules/create-an-app-to-run-parallel-compute-jobs-in-azure-batch/</a:t>
+            </a:r>
+            <a:endParaRPr lang="en-US" dirty="0"/>
+          </a:p>
+          <a:p>
+            <a:r>
+              <a:rPr lang="en-US" dirty="0"/>
+              <a:t>Azure Batch documentation</a:t>
+            </a:r>
+          </a:p>
+          <a:p>
+            <a:pPr lvl="1"/>
+            <a:r>
+              <a:rPr lang="en-US" dirty="0">
+                <a:hlinkClick r:id="rId4"/>
+              </a:rPr>
+              <a:t>https://docs.microsoft.com/en-us/azure/batch/</a:t>
+            </a:r>
+            <a:endParaRPr lang="en-US" dirty="0"/>
+          </a:p>
+          <a:p>
+            <a:pPr marL="457200" lvl="1" indent="0">
+              <a:buNone/>
+            </a:pPr>
+            <a:endParaRPr lang="en-US" dirty="0"/>
           </a:p>
         </p:txBody>
       </p:sp>
     </p:spTree>
     <p:extLst>
       <p:ext uri="{BB962C8B-B14F-4D97-AF65-F5344CB8AC3E}">
-        <p14:creationId xmlns:p14="http://schemas.microsoft.com/office/powerpoint/2010/main" val="2317227721"/>
+        <p14:creationId xmlns:p14="http://schemas.microsoft.com/office/powerpoint/2010/main" val="3313837940"/>
       </p:ext>
     </p:extLst>
   </p:cSld>

</xml_diff>